<commit_message>
Updated Chapter 2 Slides
</commit_message>
<xml_diff>
--- a/Slides/فصل ۲ - شمردن بدون شمارش/جلسه دوم.pptx
+++ b/Slides/فصل ۲ - شمردن بدون شمارش/جلسه دوم.pptx
@@ -12683,14 +12683,14 @@
       </p:sp>
       <p:sp>
         <p:nvSpPr>
-          <p:cNvPr id="363" name="۵"/>
+          <p:cNvPr id="363" name="۳"/>
           <p:cNvSpPr txBox="1"/>
           <p:nvPr/>
         </p:nvSpPr>
         <p:spPr>
           <a:xfrm>
-            <a:off x="7942328" y="4827468"/>
-            <a:ext cx="362853" cy="789941"/>
+            <a:off x="7931150" y="4827468"/>
+            <a:ext cx="385209" cy="789941"/>
           </a:xfrm>
           <a:prstGeom prst="rect">
             <a:avLst/>
@@ -12730,7 +12730,7 @@
           <a:p>
             <a:pPr/>
             <a:r>
-              <a:t>۵</a:t>
+              <a:t>۳</a:t>
             </a:r>
           </a:p>
         </p:txBody>

</xml_diff>